<commit_message>
agrego Esquema relacional en ppt
</commit_message>
<xml_diff>
--- a/SGBD Grupo 5.pptx
+++ b/SGBD Grupo 5.pptx
@@ -27,36 +27,36 @@
   <p:notesSz cx="6858000" cy="9144000"/>
   <p:embeddedFontLst>
     <p:embeddedFont>
-      <p:font typeface="Montserrat" panose="020B0604020202020204" charset="0"/>
+      <p:font typeface="Average" panose="020B0604020202020204" charset="0"/>
       <p:regular r:id="rId17"/>
-      <p:bold r:id="rId18"/>
-      <p:italic r:id="rId19"/>
-      <p:boldItalic r:id="rId20"/>
+    </p:embeddedFont>
+    <p:embeddedFont>
+      <p:font typeface="Corbel" panose="020B0503020204020204" pitchFamily="34" charset="0"/>
+      <p:regular r:id="rId18"/>
+      <p:bold r:id="rId19"/>
+      <p:italic r:id="rId20"/>
+      <p:boldItalic r:id="rId21"/>
     </p:embeddedFont>
     <p:embeddedFont>
       <p:font typeface="Lato" panose="020B0604020202020204" charset="0"/>
-      <p:regular r:id="rId21"/>
-      <p:bold r:id="rId22"/>
-      <p:italic r:id="rId23"/>
-      <p:boldItalic r:id="rId24"/>
+      <p:regular r:id="rId22"/>
+      <p:bold r:id="rId23"/>
+      <p:italic r:id="rId24"/>
+      <p:boldItalic r:id="rId25"/>
     </p:embeddedFont>
     <p:embeddedFont>
-      <p:font typeface="Corbel" panose="020B0503020204020204" pitchFamily="34" charset="0"/>
-      <p:regular r:id="rId25"/>
-      <p:bold r:id="rId26"/>
-      <p:italic r:id="rId27"/>
-      <p:boldItalic r:id="rId28"/>
+      <p:font typeface="Montserrat" panose="020B0604020202020204" charset="0"/>
+      <p:regular r:id="rId26"/>
+      <p:bold r:id="rId27"/>
+      <p:italic r:id="rId28"/>
+      <p:boldItalic r:id="rId29"/>
     </p:embeddedFont>
     <p:embeddedFont>
       <p:font typeface="Roboto" panose="020B0604020202020204" charset="0"/>
-      <p:regular r:id="rId29"/>
-      <p:bold r:id="rId30"/>
-      <p:italic r:id="rId31"/>
-      <p:boldItalic r:id="rId32"/>
-    </p:embeddedFont>
-    <p:embeddedFont>
-      <p:font typeface="Average" panose="020B0604020202020204" charset="0"/>
-      <p:regular r:id="rId33"/>
+      <p:regular r:id="rId30"/>
+      <p:bold r:id="rId31"/>
+      <p:italic r:id="rId32"/>
+      <p:boldItalic r:id="rId33"/>
     </p:embeddedFont>
   </p:embeddedFontLst>
   <p:defaultTextStyle>
@@ -2176,7 +2176,7 @@
           </a:lstStyle>
           <a:p>
             <a:r>
-              <a:rPr lang="es-ES" smtClean="0"/>
+              <a:rPr lang="es-ES"/>
               <a:t>Haga clic para modificar el estilo de título del patrón</a:t>
             </a:r>
             <a:endParaRPr lang="en-US" dirty="0"/>
@@ -2272,7 +2272,7 @@
           </a:lstStyle>
           <a:p>
             <a:r>
-              <a:rPr lang="es-ES" smtClean="0"/>
+              <a:rPr lang="es-ES"/>
               <a:t>Haga clic para editar el estilo de subtítulo del patrón</a:t>
             </a:r>
             <a:endParaRPr lang="en-US" dirty="0"/>
@@ -2410,7 +2410,7 @@
           </a:lstStyle>
           <a:p>
             <a:r>
-              <a:rPr lang="es-ES" smtClean="0"/>
+              <a:rPr lang="es-ES"/>
               <a:t>Haga clic para modificar el estilo de título del patrón</a:t>
             </a:r>
             <a:endParaRPr lang="en-US" dirty="0"/>
@@ -2475,7 +2475,7 @@
           </a:lstStyle>
           <a:p>
             <a:r>
-              <a:rPr lang="es-ES" smtClean="0"/>
+              <a:rPr lang="es-ES"/>
               <a:t>Haga clic en el icono para agregar una imagen</a:t>
             </a:r>
             <a:endParaRPr lang="en-US" dirty="0"/>
@@ -2565,7 +2565,7 @@
           <a:p>
             <a:pPr lvl="0"/>
             <a:r>
-              <a:rPr lang="es-ES" smtClean="0"/>
+              <a:rPr lang="es-ES"/>
               <a:t>Editar el estilo de texto del patrón</a:t>
             </a:r>
           </a:p>
@@ -2702,7 +2702,7 @@
           </a:lstStyle>
           <a:p>
             <a:r>
-              <a:rPr lang="es-ES" smtClean="0"/>
+              <a:rPr lang="es-ES"/>
               <a:t>Haga clic para modificar el estilo de título del patrón</a:t>
             </a:r>
             <a:endParaRPr lang="en-US" dirty="0"/>
@@ -2768,7 +2768,7 @@
           <a:p>
             <a:pPr lvl="0"/>
             <a:r>
-              <a:rPr lang="es-ES" smtClean="0"/>
+              <a:rPr lang="es-ES"/>
               <a:t>Editar el estilo de texto del patrón</a:t>
             </a:r>
           </a:p>
@@ -2905,7 +2905,7 @@
           </a:lstStyle>
           <a:p>
             <a:r>
-              <a:rPr lang="es-ES" smtClean="0"/>
+              <a:rPr lang="es-ES"/>
               <a:t>Haga clic para modificar el estilo de título del patrón</a:t>
             </a:r>
             <a:endParaRPr lang="en-US" dirty="0"/>
@@ -2973,7 +2973,7 @@
           <a:p>
             <a:pPr lvl="0"/>
             <a:r>
-              <a:rPr lang="es-ES" smtClean="0"/>
+              <a:rPr lang="es-ES"/>
               <a:t>Editar el estilo de texto del patrón</a:t>
             </a:r>
           </a:p>
@@ -3040,7 +3040,7 @@
           <a:p>
             <a:pPr lvl="0"/>
             <a:r>
-              <a:rPr lang="es-ES" smtClean="0"/>
+              <a:rPr lang="es-ES"/>
               <a:t>Editar el estilo de texto del patrón</a:t>
             </a:r>
           </a:p>
@@ -3411,7 +3411,7 @@
           </a:lstStyle>
           <a:p>
             <a:r>
-              <a:rPr lang="es-ES" smtClean="0"/>
+              <a:rPr lang="es-ES"/>
               <a:t>Haga clic para modificar el estilo de título del patrón</a:t>
             </a:r>
             <a:endParaRPr lang="en-US" dirty="0"/>
@@ -3477,7 +3477,7 @@
           <a:p>
             <a:pPr lvl="0"/>
             <a:r>
-              <a:rPr lang="es-ES" smtClean="0"/>
+              <a:rPr lang="es-ES"/>
               <a:t>Editar el estilo de texto del patrón</a:t>
             </a:r>
           </a:p>
@@ -3610,7 +3610,7 @@
           <a:lstStyle/>
           <a:p>
             <a:r>
-              <a:rPr lang="es-ES" smtClean="0"/>
+              <a:rPr lang="es-ES"/>
               <a:t>Haga clic para modificar el estilo de título del patrón</a:t>
             </a:r>
             <a:endParaRPr lang="en-US" dirty="0"/>
@@ -3705,7 +3705,7 @@
           <a:p>
             <a:pPr lvl="0"/>
             <a:r>
-              <a:rPr lang="es-ES" smtClean="0"/>
+              <a:rPr lang="es-ES"/>
               <a:t>Editar el estilo de texto del patrón</a:t>
             </a:r>
           </a:p>
@@ -3772,7 +3772,7 @@
           <a:p>
             <a:pPr lvl="0"/>
             <a:r>
-              <a:rPr lang="es-ES" smtClean="0"/>
+              <a:rPr lang="es-ES"/>
               <a:t>Editar el estilo de texto del patrón</a:t>
             </a:r>
           </a:p>
@@ -3836,7 +3836,7 @@
               <a:buNone/>
             </a:pPr>
             <a:r>
-              <a:rPr lang="es-ES" smtClean="0"/>
+              <a:rPr lang="es-ES"/>
               <a:t>Editar el estilo de texto del patrón</a:t>
             </a:r>
           </a:p>
@@ -3903,7 +3903,7 @@
           <a:p>
             <a:pPr lvl="0"/>
             <a:r>
-              <a:rPr lang="es-ES" smtClean="0"/>
+              <a:rPr lang="es-ES"/>
               <a:t>Editar el estilo de texto del patrón</a:t>
             </a:r>
           </a:p>
@@ -3967,7 +3967,7 @@
               <a:buNone/>
             </a:pPr>
             <a:r>
-              <a:rPr lang="es-ES" smtClean="0"/>
+              <a:rPr lang="es-ES"/>
               <a:t>Editar el estilo de texto del patrón</a:t>
             </a:r>
           </a:p>
@@ -4034,7 +4034,7 @@
           <a:p>
             <a:pPr lvl="0"/>
             <a:r>
-              <a:rPr lang="es-ES" smtClean="0"/>
+              <a:rPr lang="es-ES"/>
               <a:t>Editar el estilo de texto del patrón</a:t>
             </a:r>
           </a:p>
@@ -4167,7 +4167,7 @@
           <a:lstStyle/>
           <a:p>
             <a:r>
-              <a:rPr lang="es-ES" smtClean="0"/>
+              <a:rPr lang="es-ES"/>
               <a:t>Haga clic para modificar el estilo de título del patrón</a:t>
             </a:r>
             <a:endParaRPr lang="en-US" dirty="0"/>
@@ -4258,7 +4258,7 @@
           <a:p>
             <a:pPr lvl="0"/>
             <a:r>
-              <a:rPr lang="es-ES" smtClean="0"/>
+              <a:rPr lang="es-ES"/>
               <a:t>Editar el estilo de texto del patrón</a:t>
             </a:r>
           </a:p>
@@ -4336,7 +4336,7 @@
           </a:lstStyle>
           <a:p>
             <a:r>
-              <a:rPr lang="es-ES" smtClean="0"/>
+              <a:rPr lang="es-ES"/>
               <a:t>Haga clic en el icono para agregar una imagen</a:t>
             </a:r>
             <a:endParaRPr lang="en-US" dirty="0"/>
@@ -4404,7 +4404,7 @@
           <a:p>
             <a:pPr lvl="0"/>
             <a:r>
-              <a:rPr lang="es-ES" smtClean="0"/>
+              <a:rPr lang="es-ES"/>
               <a:t>Editar el estilo de texto del patrón</a:t>
             </a:r>
           </a:p>
@@ -4494,7 +4494,7 @@
           <a:p>
             <a:pPr lvl="0"/>
             <a:r>
-              <a:rPr lang="es-ES" smtClean="0"/>
+              <a:rPr lang="es-ES"/>
               <a:t>Editar el estilo de texto del patrón</a:t>
             </a:r>
           </a:p>
@@ -4572,7 +4572,7 @@
           </a:lstStyle>
           <a:p>
             <a:r>
-              <a:rPr lang="es-ES" smtClean="0"/>
+              <a:rPr lang="es-ES"/>
               <a:t>Haga clic en el icono para agregar una imagen</a:t>
             </a:r>
             <a:endParaRPr lang="en-US" dirty="0"/>
@@ -4640,7 +4640,7 @@
           <a:p>
             <a:pPr lvl="0"/>
             <a:r>
-              <a:rPr lang="es-ES" smtClean="0"/>
+              <a:rPr lang="es-ES"/>
               <a:t>Editar el estilo de texto del patrón</a:t>
             </a:r>
           </a:p>
@@ -4730,7 +4730,7 @@
           <a:p>
             <a:pPr lvl="0"/>
             <a:r>
-              <a:rPr lang="es-ES" smtClean="0"/>
+              <a:rPr lang="es-ES"/>
               <a:t>Editar el estilo de texto del patrón</a:t>
             </a:r>
           </a:p>
@@ -4808,7 +4808,7 @@
           </a:lstStyle>
           <a:p>
             <a:r>
-              <a:rPr lang="es-ES" smtClean="0"/>
+              <a:rPr lang="es-ES"/>
               <a:t>Haga clic en el icono para agregar una imagen</a:t>
             </a:r>
             <a:endParaRPr lang="en-US" dirty="0"/>
@@ -4876,7 +4876,7 @@
           <a:p>
             <a:pPr lvl="0"/>
             <a:r>
-              <a:rPr lang="es-ES" smtClean="0"/>
+              <a:rPr lang="es-ES"/>
               <a:t>Editar el estilo de texto del patrón</a:t>
             </a:r>
           </a:p>
@@ -5004,7 +5004,7 @@
           <a:lstStyle/>
           <a:p>
             <a:r>
-              <a:rPr lang="es-ES" smtClean="0"/>
+              <a:rPr lang="es-ES"/>
               <a:t>Haga clic para modificar el estilo de título del patrón</a:t>
             </a:r>
             <a:endParaRPr lang="en-US" dirty="0"/>
@@ -5028,35 +5028,35 @@
           <a:p>
             <a:pPr lvl="0"/>
             <a:r>
-              <a:rPr lang="es-ES" smtClean="0"/>
+              <a:rPr lang="es-ES"/>
               <a:t>Editar el estilo de texto del patrón</a:t>
             </a:r>
           </a:p>
           <a:p>
             <a:pPr lvl="1"/>
             <a:r>
-              <a:rPr lang="es-ES" smtClean="0"/>
+              <a:rPr lang="es-ES"/>
               <a:t>Segundo nivel</a:t>
             </a:r>
           </a:p>
           <a:p>
             <a:pPr lvl="2"/>
             <a:r>
-              <a:rPr lang="es-ES" smtClean="0"/>
+              <a:rPr lang="es-ES"/>
               <a:t>Tercer nivel</a:t>
             </a:r>
           </a:p>
           <a:p>
             <a:pPr lvl="3"/>
             <a:r>
-              <a:rPr lang="es-ES" smtClean="0"/>
+              <a:rPr lang="es-ES"/>
               <a:t>Cuarto nivel</a:t>
             </a:r>
           </a:p>
           <a:p>
             <a:pPr lvl="4"/>
             <a:r>
-              <a:rPr lang="es-ES" smtClean="0"/>
+              <a:rPr lang="es-ES"/>
               <a:t>Quinto nivel</a:t>
             </a:r>
             <a:endParaRPr lang="en-US" dirty="0"/>
@@ -5190,7 +5190,7 @@
           <a:lstStyle/>
           <a:p>
             <a:r>
-              <a:rPr lang="es-ES" smtClean="0"/>
+              <a:rPr lang="es-ES"/>
               <a:t>Haga clic para modificar el estilo de título del patrón</a:t>
             </a:r>
             <a:endParaRPr lang="en-US" dirty="0"/>
@@ -5219,35 +5219,35 @@
           <a:p>
             <a:pPr lvl="0"/>
             <a:r>
-              <a:rPr lang="es-ES" smtClean="0"/>
+              <a:rPr lang="es-ES"/>
               <a:t>Editar el estilo de texto del patrón</a:t>
             </a:r>
           </a:p>
           <a:p>
             <a:pPr lvl="1"/>
             <a:r>
-              <a:rPr lang="es-ES" smtClean="0"/>
+              <a:rPr lang="es-ES"/>
               <a:t>Segundo nivel</a:t>
             </a:r>
           </a:p>
           <a:p>
             <a:pPr lvl="2"/>
             <a:r>
-              <a:rPr lang="es-ES" smtClean="0"/>
+              <a:rPr lang="es-ES"/>
               <a:t>Tercer nivel</a:t>
             </a:r>
           </a:p>
           <a:p>
             <a:pPr lvl="3"/>
             <a:r>
-              <a:rPr lang="es-ES" smtClean="0"/>
+              <a:rPr lang="es-ES"/>
               <a:t>Cuarto nivel</a:t>
             </a:r>
           </a:p>
           <a:p>
             <a:pPr lvl="4"/>
             <a:r>
-              <a:rPr lang="es-ES" smtClean="0"/>
+              <a:rPr lang="es-ES"/>
               <a:t>Quinto nivel</a:t>
             </a:r>
             <a:endParaRPr lang="en-US" dirty="0"/>
@@ -6044,7 +6044,7 @@
           <a:lstStyle/>
           <a:p>
             <a:r>
-              <a:rPr lang="es-ES" smtClean="0"/>
+              <a:rPr lang="es-ES"/>
               <a:t>Haga clic para modificar el estilo de título del patrón</a:t>
             </a:r>
             <a:endParaRPr lang="en-US" dirty="0"/>
@@ -6068,35 +6068,35 @@
           <a:p>
             <a:pPr lvl="0"/>
             <a:r>
-              <a:rPr lang="es-ES" smtClean="0"/>
+              <a:rPr lang="es-ES"/>
               <a:t>Editar el estilo de texto del patrón</a:t>
             </a:r>
           </a:p>
           <a:p>
             <a:pPr lvl="1"/>
             <a:r>
-              <a:rPr lang="es-ES" smtClean="0"/>
+              <a:rPr lang="es-ES"/>
               <a:t>Segundo nivel</a:t>
             </a:r>
           </a:p>
           <a:p>
             <a:pPr lvl="2"/>
             <a:r>
-              <a:rPr lang="es-ES" smtClean="0"/>
+              <a:rPr lang="es-ES"/>
               <a:t>Tercer nivel</a:t>
             </a:r>
           </a:p>
           <a:p>
             <a:pPr lvl="3"/>
             <a:r>
-              <a:rPr lang="es-ES" smtClean="0"/>
+              <a:rPr lang="es-ES"/>
               <a:t>Cuarto nivel</a:t>
             </a:r>
           </a:p>
           <a:p>
             <a:pPr lvl="4"/>
             <a:r>
-              <a:rPr lang="es-ES" smtClean="0"/>
+              <a:rPr lang="es-ES"/>
               <a:t>Quinto nivel</a:t>
             </a:r>
             <a:endParaRPr lang="en-US" dirty="0"/>
@@ -7561,7 +7561,7 @@
           </a:lstStyle>
           <a:p>
             <a:r>
-              <a:rPr lang="es-ES" smtClean="0"/>
+              <a:rPr lang="es-ES"/>
               <a:t>Haga clic para modificar el estilo de título del patrón</a:t>
             </a:r>
             <a:endParaRPr lang="en-US" dirty="0"/>
@@ -7657,7 +7657,7 @@
           </a:lstStyle>
           <a:p>
             <a:r>
-              <a:rPr lang="es-ES" smtClean="0"/>
+              <a:rPr lang="es-ES"/>
               <a:t>Haga clic para editar el estilo de subtítulo del patrón</a:t>
             </a:r>
             <a:endParaRPr lang="en-US" dirty="0"/>
@@ -7786,7 +7786,7 @@
           <a:lstStyle/>
           <a:p>
             <a:r>
-              <a:rPr lang="es-ES" smtClean="0"/>
+              <a:rPr lang="es-ES"/>
               <a:t>Haga clic para modificar el estilo de título del patrón</a:t>
             </a:r>
             <a:endParaRPr lang="en-US" dirty="0"/>
@@ -7815,35 +7815,35 @@
           <a:p>
             <a:pPr lvl="0"/>
             <a:r>
-              <a:rPr lang="es-ES" smtClean="0"/>
+              <a:rPr lang="es-ES"/>
               <a:t>Editar el estilo de texto del patrón</a:t>
             </a:r>
           </a:p>
           <a:p>
             <a:pPr lvl="1"/>
             <a:r>
-              <a:rPr lang="es-ES" smtClean="0"/>
+              <a:rPr lang="es-ES"/>
               <a:t>Segundo nivel</a:t>
             </a:r>
           </a:p>
           <a:p>
             <a:pPr lvl="2"/>
             <a:r>
-              <a:rPr lang="es-ES" smtClean="0"/>
+              <a:rPr lang="es-ES"/>
               <a:t>Tercer nivel</a:t>
             </a:r>
           </a:p>
           <a:p>
             <a:pPr lvl="3"/>
             <a:r>
-              <a:rPr lang="es-ES" smtClean="0"/>
+              <a:rPr lang="es-ES"/>
               <a:t>Cuarto nivel</a:t>
             </a:r>
           </a:p>
           <a:p>
             <a:pPr lvl="4"/>
             <a:r>
-              <a:rPr lang="es-ES" smtClean="0"/>
+              <a:rPr lang="es-ES"/>
               <a:t>Quinto nivel</a:t>
             </a:r>
             <a:endParaRPr lang="en-US" dirty="0"/>
@@ -7872,35 +7872,35 @@
           <a:p>
             <a:pPr lvl="0"/>
             <a:r>
-              <a:rPr lang="es-ES" smtClean="0"/>
+              <a:rPr lang="es-ES"/>
               <a:t>Editar el estilo de texto del patrón</a:t>
             </a:r>
           </a:p>
           <a:p>
             <a:pPr lvl="1"/>
             <a:r>
-              <a:rPr lang="es-ES" smtClean="0"/>
+              <a:rPr lang="es-ES"/>
               <a:t>Segundo nivel</a:t>
             </a:r>
           </a:p>
           <a:p>
             <a:pPr lvl="2"/>
             <a:r>
-              <a:rPr lang="es-ES" smtClean="0"/>
+              <a:rPr lang="es-ES"/>
               <a:t>Tercer nivel</a:t>
             </a:r>
           </a:p>
           <a:p>
             <a:pPr lvl="3"/>
             <a:r>
-              <a:rPr lang="es-ES" smtClean="0"/>
+              <a:rPr lang="es-ES"/>
               <a:t>Cuarto nivel</a:t>
             </a:r>
           </a:p>
           <a:p>
             <a:pPr lvl="4"/>
             <a:r>
-              <a:rPr lang="es-ES" smtClean="0"/>
+              <a:rPr lang="es-ES"/>
               <a:t>Quinto nivel</a:t>
             </a:r>
             <a:endParaRPr lang="en-US" dirty="0"/>
@@ -8034,7 +8034,7 @@
           <a:lstStyle/>
           <a:p>
             <a:r>
-              <a:rPr lang="es-ES" smtClean="0"/>
+              <a:rPr lang="es-ES"/>
               <a:t>Haga clic para modificar el estilo de título del patrón</a:t>
             </a:r>
             <a:endParaRPr lang="en-US" dirty="0"/>
@@ -8127,7 +8127,7 @@
           <a:p>
             <a:pPr lvl="0"/>
             <a:r>
-              <a:rPr lang="es-ES" smtClean="0"/>
+              <a:rPr lang="es-ES"/>
               <a:t>Editar el estilo de texto del patrón</a:t>
             </a:r>
           </a:p>
@@ -8155,35 +8155,35 @@
           <a:p>
             <a:pPr lvl="0"/>
             <a:r>
-              <a:rPr lang="es-ES" smtClean="0"/>
+              <a:rPr lang="es-ES"/>
               <a:t>Editar el estilo de texto del patrón</a:t>
             </a:r>
           </a:p>
           <a:p>
             <a:pPr lvl="1"/>
             <a:r>
-              <a:rPr lang="es-ES" smtClean="0"/>
+              <a:rPr lang="es-ES"/>
               <a:t>Segundo nivel</a:t>
             </a:r>
           </a:p>
           <a:p>
             <a:pPr lvl="2"/>
             <a:r>
-              <a:rPr lang="es-ES" smtClean="0"/>
+              <a:rPr lang="es-ES"/>
               <a:t>Tercer nivel</a:t>
             </a:r>
           </a:p>
           <a:p>
             <a:pPr lvl="3"/>
             <a:r>
-              <a:rPr lang="es-ES" smtClean="0"/>
+              <a:rPr lang="es-ES"/>
               <a:t>Cuarto nivel</a:t>
             </a:r>
           </a:p>
           <a:p>
             <a:pPr lvl="4"/>
             <a:r>
-              <a:rPr lang="es-ES" smtClean="0"/>
+              <a:rPr lang="es-ES"/>
               <a:t>Quinto nivel</a:t>
             </a:r>
             <a:endParaRPr lang="en-US" dirty="0"/>
@@ -8248,7 +8248,7 @@
               <a:buNone/>
             </a:pPr>
             <a:r>
-              <a:rPr lang="es-ES" smtClean="0"/>
+              <a:rPr lang="es-ES"/>
               <a:t>Editar el estilo de texto del patrón</a:t>
             </a:r>
           </a:p>
@@ -8276,35 +8276,35 @@
           <a:p>
             <a:pPr lvl="0"/>
             <a:r>
-              <a:rPr lang="es-ES" smtClean="0"/>
+              <a:rPr lang="es-ES"/>
               <a:t>Editar el estilo de texto del patrón</a:t>
             </a:r>
           </a:p>
           <a:p>
             <a:pPr lvl="1"/>
             <a:r>
-              <a:rPr lang="es-ES" smtClean="0"/>
+              <a:rPr lang="es-ES"/>
               <a:t>Segundo nivel</a:t>
             </a:r>
           </a:p>
           <a:p>
             <a:pPr lvl="2"/>
             <a:r>
-              <a:rPr lang="es-ES" smtClean="0"/>
+              <a:rPr lang="es-ES"/>
               <a:t>Tercer nivel</a:t>
             </a:r>
           </a:p>
           <a:p>
             <a:pPr lvl="3"/>
             <a:r>
-              <a:rPr lang="es-ES" smtClean="0"/>
+              <a:rPr lang="es-ES"/>
               <a:t>Cuarto nivel</a:t>
             </a:r>
           </a:p>
           <a:p>
             <a:pPr lvl="4"/>
             <a:r>
-              <a:rPr lang="es-ES" smtClean="0"/>
+              <a:rPr lang="es-ES"/>
               <a:t>Quinto nivel</a:t>
             </a:r>
             <a:endParaRPr lang="en-US" dirty="0"/>
@@ -8433,7 +8433,7 @@
           <a:lstStyle/>
           <a:p>
             <a:r>
-              <a:rPr lang="es-ES" smtClean="0"/>
+              <a:rPr lang="es-ES"/>
               <a:t>Haga clic para modificar el estilo de título del patrón</a:t>
             </a:r>
             <a:endParaRPr lang="en-US" dirty="0"/>
@@ -8677,7 +8677,7 @@
           </a:lstStyle>
           <a:p>
             <a:r>
-              <a:rPr lang="es-ES" smtClean="0"/>
+              <a:rPr lang="es-ES"/>
               <a:t>Haga clic para modificar el estilo de título del patrón</a:t>
             </a:r>
             <a:endParaRPr lang="en-US" dirty="0"/>
@@ -8706,35 +8706,35 @@
           <a:p>
             <a:pPr lvl="0"/>
             <a:r>
-              <a:rPr lang="es-ES" smtClean="0"/>
+              <a:rPr lang="es-ES"/>
               <a:t>Editar el estilo de texto del patrón</a:t>
             </a:r>
           </a:p>
           <a:p>
             <a:pPr lvl="1"/>
             <a:r>
-              <a:rPr lang="es-ES" smtClean="0"/>
+              <a:rPr lang="es-ES"/>
               <a:t>Segundo nivel</a:t>
             </a:r>
           </a:p>
           <a:p>
             <a:pPr lvl="2"/>
             <a:r>
-              <a:rPr lang="es-ES" smtClean="0"/>
+              <a:rPr lang="es-ES"/>
               <a:t>Tercer nivel</a:t>
             </a:r>
           </a:p>
           <a:p>
             <a:pPr lvl="3"/>
             <a:r>
-              <a:rPr lang="es-ES" smtClean="0"/>
+              <a:rPr lang="es-ES"/>
               <a:t>Cuarto nivel</a:t>
             </a:r>
           </a:p>
           <a:p>
             <a:pPr lvl="4"/>
             <a:r>
-              <a:rPr lang="es-ES" smtClean="0"/>
+              <a:rPr lang="es-ES"/>
               <a:t>Quinto nivel</a:t>
             </a:r>
             <a:endParaRPr lang="en-US" dirty="0"/>
@@ -8824,7 +8824,7 @@
           <a:p>
             <a:pPr lvl="0"/>
             <a:r>
-              <a:rPr lang="es-ES" smtClean="0"/>
+              <a:rPr lang="es-ES"/>
               <a:t>Editar el estilo de texto del patrón</a:t>
             </a:r>
           </a:p>
@@ -8961,7 +8961,7 @@
           </a:lstStyle>
           <a:p>
             <a:r>
-              <a:rPr lang="es-ES" smtClean="0"/>
+              <a:rPr lang="es-ES"/>
               <a:t>Haga clic para modificar el estilo de título del patrón</a:t>
             </a:r>
             <a:endParaRPr lang="en-US" dirty="0"/>
@@ -9026,7 +9026,7 @@
           </a:lstStyle>
           <a:p>
             <a:r>
-              <a:rPr lang="es-ES" smtClean="0"/>
+              <a:rPr lang="es-ES"/>
               <a:t>Haga clic en el icono para agregar una imagen</a:t>
             </a:r>
             <a:endParaRPr lang="en-US" dirty="0"/>
@@ -9116,7 +9116,7 @@
           <a:p>
             <a:pPr lvl="0"/>
             <a:r>
-              <a:rPr lang="es-ES" smtClean="0"/>
+              <a:rPr lang="es-ES"/>
               <a:t>Editar el estilo de texto del patrón</a:t>
             </a:r>
           </a:p>
@@ -9268,7 +9268,7 @@
           <a:lstStyle/>
           <a:p>
             <a:r>
-              <a:rPr lang="es-ES" smtClean="0"/>
+              <a:rPr lang="es-ES"/>
               <a:t>Haga clic para modificar el estilo de título del patrón</a:t>
             </a:r>
             <a:endParaRPr lang="en-US" dirty="0"/>
@@ -9302,35 +9302,35 @@
           <a:p>
             <a:pPr lvl="0"/>
             <a:r>
-              <a:rPr lang="es-ES" smtClean="0"/>
+              <a:rPr lang="es-ES"/>
               <a:t>Editar el estilo de texto del patrón</a:t>
             </a:r>
           </a:p>
           <a:p>
             <a:pPr lvl="1"/>
             <a:r>
-              <a:rPr lang="es-ES" smtClean="0"/>
+              <a:rPr lang="es-ES"/>
               <a:t>Segundo nivel</a:t>
             </a:r>
           </a:p>
           <a:p>
             <a:pPr lvl="2"/>
             <a:r>
-              <a:rPr lang="es-ES" smtClean="0"/>
+              <a:rPr lang="es-ES"/>
               <a:t>Tercer nivel</a:t>
             </a:r>
           </a:p>
           <a:p>
             <a:pPr lvl="3"/>
             <a:r>
-              <a:rPr lang="es-ES" smtClean="0"/>
+              <a:rPr lang="es-ES"/>
               <a:t>Cuarto nivel</a:t>
             </a:r>
           </a:p>
           <a:p>
             <a:pPr lvl="4"/>
             <a:r>
-              <a:rPr lang="es-ES" smtClean="0"/>
+              <a:rPr lang="es-ES"/>
               <a:t>Quinto nivel</a:t>
             </a:r>
             <a:endParaRPr lang="en-US" dirty="0"/>
@@ -10126,7 +10126,7 @@
               <a:buFontTx/>
             </a:pPr>
             <a:r>
-              <a:rPr lang="en-US" sz="6600" b="1" dirty="0" smtClean="0"/>
+              <a:rPr lang="en-US" sz="6600" b="1" dirty="0"/>
               <a:t>SGBD: </a:t>
             </a:r>
           </a:p>
@@ -10136,10 +10136,9 @@
               <a:buFontTx/>
             </a:pPr>
             <a:r>
-              <a:rPr lang="en-US" sz="6600" b="1" dirty="0" smtClean="0"/>
+              <a:rPr lang="en-US" sz="6600" b="1" dirty="0"/>
               <a:t>Venta de Rifas</a:t>
             </a:r>
-            <a:endParaRPr lang="en-US" sz="6600" b="1" dirty="0"/>
           </a:p>
         </p:txBody>
       </p:sp>
@@ -10436,7 +10435,7 @@
               <a:buNone/>
             </a:pPr>
             <a:r>
-              <a:rPr lang="en-US" sz="1800" smtClean="0"/>
+              <a:rPr lang="en-US" sz="1800"/>
               <a:t>Grupo 5:</a:t>
             </a:r>
           </a:p>
@@ -10453,7 +10452,7 @@
               <a:buNone/>
             </a:pPr>
             <a:r>
-              <a:rPr lang="en-US" sz="1800" smtClean="0"/>
+              <a:rPr lang="en-US" sz="1800"/>
               <a:t>Saucedo, Juan Pablo</a:t>
             </a:r>
           </a:p>
@@ -10470,7 +10469,7 @@
               <a:buNone/>
             </a:pPr>
             <a:r>
-              <a:rPr lang="en-US" sz="1800" smtClean="0"/>
+              <a:rPr lang="en-US" sz="1800"/>
               <a:t>Funes, Joaquín</a:t>
             </a:r>
           </a:p>
@@ -10487,7 +10486,7 @@
               <a:buNone/>
             </a:pPr>
             <a:r>
-              <a:rPr lang="en-US" sz="1800" smtClean="0"/>
+              <a:rPr lang="en-US" sz="1800"/>
               <a:t>Cavanagh, Juan </a:t>
             </a:r>
           </a:p>
@@ -10504,7 +10503,7 @@
               <a:buNone/>
             </a:pPr>
             <a:r>
-              <a:rPr lang="en-US" sz="1800" smtClean="0"/>
+              <a:rPr lang="en-US" sz="1800"/>
               <a:t>Mercau, Nehemias</a:t>
             </a:r>
           </a:p>
@@ -10886,24 +10885,16 @@
           <a:chExt cx="0" cy="0"/>
         </a:xfrm>
       </p:grpSpPr>
-      <p:pic>
-        <p:nvPicPr>
-          <p:cNvPr id="337" name="Google Shape;337;p28"/>
-          <p:cNvPicPr preferRelativeResize="0"/>
+      <p:sp>
+        <p:nvSpPr>
+          <p:cNvPr id="338" name="Google Shape;338;p28"/>
+          <p:cNvSpPr txBox="1"/>
           <p:nvPr/>
-        </p:nvPicPr>
-        <p:blipFill>
-          <a:blip r:embed="rId3">
-            <a:alphaModFix/>
-          </a:blip>
-          <a:stretch>
-            <a:fillRect/>
-          </a:stretch>
-        </p:blipFill>
+        </p:nvSpPr>
         <p:spPr>
           <a:xfrm>
-            <a:off x="0" y="1515895"/>
-            <a:ext cx="9143999" cy="3285156"/>
+            <a:off x="202019" y="0"/>
+            <a:ext cx="8502832" cy="839972"/>
           </a:xfrm>
           <a:prstGeom prst="rect">
             <a:avLst/>
@@ -10913,26 +10904,6 @@
             <a:noFill/>
           </a:ln>
         </p:spPr>
-      </p:pic>
-      <p:sp>
-        <p:nvSpPr>
-          <p:cNvPr id="338" name="Google Shape;338;p28"/>
-          <p:cNvSpPr txBox="1"/>
-          <p:nvPr/>
-        </p:nvSpPr>
-        <p:spPr>
-          <a:xfrm>
-            <a:off x="1198550" y="260250"/>
-            <a:ext cx="7506300" cy="1034100"/>
-          </a:xfrm>
-          <a:prstGeom prst="rect">
-            <a:avLst/>
-          </a:prstGeom>
-          <a:noFill/>
-          <a:ln>
-            <a:noFill/>
-          </a:ln>
-        </p:spPr>
         <p:txBody>
           <a:bodyPr spcFirstLastPara="1" wrap="square" lIns="91425" tIns="91425" rIns="91425" bIns="91425" anchor="ctr" anchorCtr="0">
             <a:noAutofit/>
@@ -10949,15 +10920,15 @@
               <a:buNone/>
             </a:pPr>
             <a:r>
-              <a:rPr lang="es" sz="2400">
+              <a:rPr lang="es" sz="2400" b="1" dirty="0">
                 <a:latin typeface="Montserrat"/>
                 <a:ea typeface="Montserrat"/>
                 <a:cs typeface="Montserrat"/>
                 <a:sym typeface="Montserrat"/>
               </a:rPr>
-              <a:t>Esquema relacional</a:t>
-            </a:r>
-            <a:endParaRPr sz="2400">
+              <a:t>Esquema Relacional</a:t>
+            </a:r>
+            <a:endParaRPr sz="2400" b="1" dirty="0">
               <a:latin typeface="Montserrat"/>
               <a:ea typeface="Montserrat"/>
               <a:cs typeface="Montserrat"/>
@@ -10966,6 +10937,36 @@
           </a:p>
         </p:txBody>
       </p:sp>
+      <p:pic>
+        <p:nvPicPr>
+          <p:cNvPr id="3" name="Imagen 2">
+            <a:extLst>
+              <a:ext uri="{FF2B5EF4-FFF2-40B4-BE49-F238E27FC236}">
+                <a16:creationId xmlns:a16="http://schemas.microsoft.com/office/drawing/2014/main" id="{67524281-39A4-4629-807D-038FAA4BF0E9}"/>
+              </a:ext>
+            </a:extLst>
+          </p:cNvPr>
+          <p:cNvPicPr>
+            <a:picLocks noChangeAspect="1"/>
+          </p:cNvPicPr>
+          <p:nvPr/>
+        </p:nvPicPr>
+        <p:blipFill>
+          <a:blip r:embed="rId3"/>
+          <a:stretch>
+            <a:fillRect/>
+          </a:stretch>
+        </p:blipFill>
+        <p:spPr>
+          <a:xfrm>
+            <a:off x="0" y="1031358"/>
+            <a:ext cx="9144000" cy="3965944"/>
+          </a:xfrm>
+          <a:prstGeom prst="rect">
+            <a:avLst/>
+          </a:prstGeom>
+        </p:spPr>
+      </p:pic>
     </p:spTree>
   </p:cSld>
   <p:clrMapOvr>
@@ -11052,7 +11053,7 @@
           <a:lstStyle/>
           <a:p>
             <a:r>
-              <a:rPr lang="es-ES" sz="2400" b="1" dirty="0" smtClean="0"/>
+              <a:rPr lang="es-ES" sz="2400" b="1" dirty="0"/>
               <a:t>PDM</a:t>
             </a:r>
             <a:endParaRPr lang="en-US" sz="2400" b="1" dirty="0"/>
@@ -11270,7 +11271,7 @@
                 <a:hlinkClick r:id="rId3" action="ppaction://hlinksldjump">
                   <a:extLst>
                     <a:ext uri="{A12FA001-AC4F-418D-AE19-62706E023703}">
-                      <ahyp:hlinkClr xmlns:ahyp="http://schemas.microsoft.com/office/drawing/2018/hyperlinkcolor" xmlns:p15="http://schemas.microsoft.com/office/powerpoint/2012/main" xmlns:p14="http://schemas.microsoft.com/office/powerpoint/2010/main" xmlns:com="http://schemas.openxmlformats.org/drawingml/2006/compatibility" xmlns:pvml="urn:schemas-microsoft-com:office:powerpoint" xmlns:v="urn:schemas-microsoft-com:vml" xmlns:o="urn:schemas-microsoft-com:office:office" xmlns:dgm="http://schemas.openxmlformats.org/drawingml/2006/diagram" xmlns:c="http://schemas.openxmlformats.org/drawingml/2006/chart" xmlns:mv="urn:schemas-microsoft-com:mac:vml" xmlns:mc="http://schemas.openxmlformats.org/markup-compatibility/2006" xmlns="" val="tx"/>
+                      <ahyp:hlinkClr xmlns:ahyp="http://schemas.microsoft.com/office/drawing/2018/hyperlinkcolor" val="tx"/>
                     </a:ext>
                   </a:extLst>
                 </a:hlinkClick>
@@ -11308,7 +11309,7 @@
                 <a:hlinkClick r:id="rId4" action="ppaction://hlinksldjump">
                   <a:extLst>
                     <a:ext uri="{A12FA001-AC4F-418D-AE19-62706E023703}">
-                      <ahyp:hlinkClr xmlns:ahyp="http://schemas.microsoft.com/office/drawing/2018/hyperlinkcolor" xmlns:p15="http://schemas.microsoft.com/office/powerpoint/2012/main" xmlns:p14="http://schemas.microsoft.com/office/powerpoint/2010/main" xmlns:com="http://schemas.openxmlformats.org/drawingml/2006/compatibility" xmlns:pvml="urn:schemas-microsoft-com:office:powerpoint" xmlns:v="urn:schemas-microsoft-com:vml" xmlns:o="urn:schemas-microsoft-com:office:office" xmlns:dgm="http://schemas.openxmlformats.org/drawingml/2006/diagram" xmlns:c="http://schemas.openxmlformats.org/drawingml/2006/chart" xmlns:mv="urn:schemas-microsoft-com:mac:vml" xmlns:mc="http://schemas.openxmlformats.org/markup-compatibility/2006" xmlns="" val="tx"/>
+                      <ahyp:hlinkClr xmlns:ahyp="http://schemas.microsoft.com/office/drawing/2018/hyperlinkcolor" val="tx"/>
                     </a:ext>
                   </a:extLst>
                 </a:hlinkClick>
@@ -11354,34 +11355,12 @@
                 <a:hlinkClick r:id="rId3" action="ppaction://hlinksldjump">
                   <a:extLst>
                     <a:ext uri="{A12FA001-AC4F-418D-AE19-62706E023703}">
-                      <ahyp:hlinkClr xmlns:ahyp="http://schemas.microsoft.com/office/drawing/2018/hyperlinkcolor" xmlns:p15="http://schemas.microsoft.com/office/powerpoint/2012/main" xmlns:p14="http://schemas.microsoft.com/office/powerpoint/2010/main" xmlns:com="http://schemas.openxmlformats.org/drawingml/2006/compatibility" xmlns:pvml="urn:schemas-microsoft-com:office:powerpoint" xmlns:v="urn:schemas-microsoft-com:vml" xmlns:o="urn:schemas-microsoft-com:office:office" xmlns:dgm="http://schemas.openxmlformats.org/drawingml/2006/diagram" xmlns:c="http://schemas.openxmlformats.org/drawingml/2006/chart" xmlns:mv="urn:schemas-microsoft-com:mac:vml" xmlns:mc="http://schemas.openxmlformats.org/markup-compatibility/2006" xmlns="" val="tx"/>
+                      <ahyp:hlinkClr xmlns:ahyp="http://schemas.microsoft.com/office/drawing/2018/hyperlinkcolor" val="tx"/>
                     </a:ext>
                   </a:extLst>
                 </a:hlinkClick>
               </a:rPr>
-              <a:t>Diagrama Entidad </a:t>
-            </a:r>
-            <a:r>
-              <a:rPr lang="es" sz="1100" dirty="0">
-                <a:solidFill>
-                  <a:srgbClr val="FFFFFF"/>
-                </a:solidFill>
-                <a:uFill>
-                  <a:noFill/>
-                </a:uFill>
-                <a:latin typeface="Montserrat"/>
-                <a:ea typeface="Montserrat"/>
-                <a:cs typeface="Montserrat"/>
-                <a:sym typeface="Montserrat"/>
-                <a:hlinkClick r:id="rId3" action="ppaction://hlinksldjump">
-                  <a:extLst>
-                    <a:ext uri="{A12FA001-AC4F-418D-AE19-62706E023703}">
-                      <ahyp:hlinkClr xmlns:ahyp="http://schemas.microsoft.com/office/drawing/2018/hyperlinkcolor" xmlns:p15="http://schemas.microsoft.com/office/powerpoint/2012/main" xmlns:p14="http://schemas.microsoft.com/office/powerpoint/2010/main" xmlns:com="http://schemas.openxmlformats.org/drawingml/2006/compatibility" xmlns:pvml="urn:schemas-microsoft-com:office:powerpoint" xmlns:v="urn:schemas-microsoft-com:vml" xmlns:o="urn:schemas-microsoft-com:office:office" xmlns:dgm="http://schemas.openxmlformats.org/drawingml/2006/diagram" xmlns:c="http://schemas.openxmlformats.org/drawingml/2006/chart" xmlns:mv="urn:schemas-microsoft-com:mac:vml" xmlns:mc="http://schemas.openxmlformats.org/markup-compatibility/2006" xmlns="" val="tx"/>
-                    </a:ext>
-                  </a:extLst>
-                </a:hlinkClick>
-              </a:rPr>
-              <a:t>Relación</a:t>
+              <a:t>Diagrama Entidad Relación</a:t>
             </a:r>
             <a:endParaRPr sz="1100" dirty="0">
               <a:solidFill>
@@ -11422,56 +11401,12 @@
                 <a:hlinkClick r:id="rId5" action="ppaction://hlinksldjump">
                   <a:extLst>
                     <a:ext uri="{A12FA001-AC4F-418D-AE19-62706E023703}">
-                      <ahyp:hlinkClr xmlns:ahyp="http://schemas.microsoft.com/office/drawing/2018/hyperlinkcolor" xmlns:p15="http://schemas.microsoft.com/office/powerpoint/2012/main" xmlns:p14="http://schemas.microsoft.com/office/powerpoint/2010/main" xmlns:com="http://schemas.openxmlformats.org/drawingml/2006/compatibility" xmlns:pvml="urn:schemas-microsoft-com:office:powerpoint" xmlns:v="urn:schemas-microsoft-com:vml" xmlns:o="urn:schemas-microsoft-com:office:office" xmlns:dgm="http://schemas.openxmlformats.org/drawingml/2006/diagram" xmlns:c="http://schemas.openxmlformats.org/drawingml/2006/chart" xmlns:mv="urn:schemas-microsoft-com:mac:vml" xmlns:mc="http://schemas.openxmlformats.org/markup-compatibility/2006" xmlns="" val="tx"/>
+                      <ahyp:hlinkClr xmlns:ahyp="http://schemas.microsoft.com/office/drawing/2018/hyperlinkcolor" val="tx"/>
                     </a:ext>
                   </a:extLst>
                 </a:hlinkClick>
               </a:rPr>
-              <a:t>Modelo </a:t>
-            </a:r>
-            <a:r>
-              <a:rPr lang="es" sz="1100" dirty="0">
-                <a:solidFill>
-                  <a:srgbClr val="FFFFFF"/>
-                </a:solidFill>
-                <a:uFill>
-                  <a:noFill/>
-                </a:uFill>
-                <a:latin typeface="Montserrat"/>
-                <a:ea typeface="Montserrat"/>
-                <a:cs typeface="Montserrat"/>
-                <a:sym typeface="Montserrat"/>
-                <a:hlinkClick r:id="rId5" action="ppaction://hlinksldjump">
-                  <a:extLst>
-                    <a:ext uri="{A12FA001-AC4F-418D-AE19-62706E023703}">
-                      <ahyp:hlinkClr xmlns:ahyp="http://schemas.microsoft.com/office/drawing/2018/hyperlinkcolor" xmlns:p15="http://schemas.microsoft.com/office/powerpoint/2012/main" xmlns:p14="http://schemas.microsoft.com/office/powerpoint/2010/main" xmlns:com="http://schemas.openxmlformats.org/drawingml/2006/compatibility" xmlns:pvml="urn:schemas-microsoft-com:office:powerpoint" xmlns:v="urn:schemas-microsoft-com:vml" xmlns:o="urn:schemas-microsoft-com:office:office" xmlns:dgm="http://schemas.openxmlformats.org/drawingml/2006/diagram" xmlns:c="http://schemas.openxmlformats.org/drawingml/2006/chart" xmlns:mv="urn:schemas-microsoft-com:mac:vml" xmlns:mc="http://schemas.openxmlformats.org/markup-compatibility/2006" xmlns="" val="tx"/>
-                    </a:ext>
-                  </a:extLst>
-                </a:hlinkClick>
-              </a:rPr>
-              <a:t>Físico</a:t>
-            </a:r>
-            <a:r>
-              <a:rPr lang="es" sz="1100" dirty="0">
-                <a:solidFill>
-                  <a:srgbClr val="FFFFFF"/>
-                </a:solidFill>
-                <a:uFill>
-                  <a:noFill/>
-                </a:uFill>
-                <a:latin typeface="Montserrat"/>
-                <a:ea typeface="Montserrat"/>
-                <a:cs typeface="Montserrat"/>
-                <a:sym typeface="Montserrat"/>
-                <a:hlinkClick r:id="rId5" action="ppaction://hlinksldjump">
-                  <a:extLst>
-                    <a:ext uri="{A12FA001-AC4F-418D-AE19-62706E023703}">
-                      <ahyp:hlinkClr xmlns:ahyp="http://schemas.microsoft.com/office/drawing/2018/hyperlinkcolor" xmlns:p15="http://schemas.microsoft.com/office/powerpoint/2012/main" xmlns:p14="http://schemas.microsoft.com/office/powerpoint/2010/main" xmlns:com="http://schemas.openxmlformats.org/drawingml/2006/compatibility" xmlns:pvml="urn:schemas-microsoft-com:office:powerpoint" xmlns:v="urn:schemas-microsoft-com:vml" xmlns:o="urn:schemas-microsoft-com:office:office" xmlns:dgm="http://schemas.openxmlformats.org/drawingml/2006/diagram" xmlns:c="http://schemas.openxmlformats.org/drawingml/2006/chart" xmlns:mv="urn:schemas-microsoft-com:mac:vml" xmlns:mc="http://schemas.openxmlformats.org/markup-compatibility/2006" xmlns="" val="tx"/>
-                    </a:ext>
-                  </a:extLst>
-                </a:hlinkClick>
-              </a:rPr>
-              <a:t> </a:t>
+              <a:t>Modelo Físico </a:t>
             </a:r>
             <a:endParaRPr sz="1100" dirty="0">
               <a:solidFill>
@@ -11512,7 +11447,7 @@
                 <a:hlinkClick r:id="rId6" action="ppaction://hlinksldjump">
                   <a:extLst>
                     <a:ext uri="{A12FA001-AC4F-418D-AE19-62706E023703}">
-                      <ahyp:hlinkClr xmlns:ahyp="http://schemas.microsoft.com/office/drawing/2018/hyperlinkcolor" xmlns:p15="http://schemas.microsoft.com/office/powerpoint/2012/main" xmlns:p14="http://schemas.microsoft.com/office/powerpoint/2010/main" xmlns:com="http://schemas.openxmlformats.org/drawingml/2006/compatibility" xmlns:pvml="urn:schemas-microsoft-com:office:powerpoint" xmlns:v="urn:schemas-microsoft-com:vml" xmlns:o="urn:schemas-microsoft-com:office:office" xmlns:dgm="http://schemas.openxmlformats.org/drawingml/2006/diagram" xmlns:c="http://schemas.openxmlformats.org/drawingml/2006/chart" xmlns:mv="urn:schemas-microsoft-com:mac:vml" xmlns:mc="http://schemas.openxmlformats.org/markup-compatibility/2006" xmlns="" val="tx"/>
+                      <ahyp:hlinkClr xmlns:ahyp="http://schemas.microsoft.com/office/drawing/2018/hyperlinkcolor" val="tx"/>
                     </a:ext>
                   </a:extLst>
                 </a:hlinkClick>
@@ -11603,7 +11538,7 @@
                 <a:hlinkClick r:id="rId7" action="ppaction://hlinksldjump">
                   <a:extLst>
                     <a:ext uri="{A12FA001-AC4F-418D-AE19-62706E023703}">
-                      <ahyp:hlinkClr xmlns:ahyp="http://schemas.microsoft.com/office/drawing/2018/hyperlinkcolor" xmlns:p15="http://schemas.microsoft.com/office/powerpoint/2012/main" xmlns:p14="http://schemas.microsoft.com/office/powerpoint/2010/main" xmlns:com="http://schemas.openxmlformats.org/drawingml/2006/compatibility" xmlns:pvml="urn:schemas-microsoft-com:office:powerpoint" xmlns:v="urn:schemas-microsoft-com:vml" xmlns:o="urn:schemas-microsoft-com:office:office" xmlns:dgm="http://schemas.openxmlformats.org/drawingml/2006/diagram" xmlns:c="http://schemas.openxmlformats.org/drawingml/2006/chart" xmlns:mv="urn:schemas-microsoft-com:mac:vml" xmlns:mc="http://schemas.openxmlformats.org/markup-compatibility/2006" xmlns="" val="tx"/>
+                      <ahyp:hlinkClr xmlns:ahyp="http://schemas.microsoft.com/office/drawing/2018/hyperlinkcolor" val="tx"/>
                     </a:ext>
                   </a:extLst>
                 </a:hlinkClick>
@@ -11648,7 +11583,7 @@
                 <a:hlinkClick r:id="rId8" action="ppaction://hlinksldjump">
                   <a:extLst>
                     <a:ext uri="{A12FA001-AC4F-418D-AE19-62706E023703}">
-                      <ahyp:hlinkClr xmlns:ahyp="http://schemas.microsoft.com/office/drawing/2018/hyperlinkcolor" xmlns:p15="http://schemas.microsoft.com/office/powerpoint/2012/main" xmlns:p14="http://schemas.microsoft.com/office/powerpoint/2010/main" xmlns:com="http://schemas.openxmlformats.org/drawingml/2006/compatibility" xmlns:pvml="urn:schemas-microsoft-com:office:powerpoint" xmlns:v="urn:schemas-microsoft-com:vml" xmlns:o="urn:schemas-microsoft-com:office:office" xmlns:dgm="http://schemas.openxmlformats.org/drawingml/2006/diagram" xmlns:c="http://schemas.openxmlformats.org/drawingml/2006/chart" xmlns:mv="urn:schemas-microsoft-com:mac:vml" xmlns:mc="http://schemas.openxmlformats.org/markup-compatibility/2006" xmlns="" val="tx"/>
+                      <ahyp:hlinkClr xmlns:ahyp="http://schemas.microsoft.com/office/drawing/2018/hyperlinkcolor" val="tx"/>
                     </a:ext>
                   </a:extLst>
                 </a:hlinkClick>
@@ -11693,7 +11628,7 @@
                 <a:hlinkClick r:id="rId9" action="ppaction://hlinksldjump">
                   <a:extLst>
                     <a:ext uri="{A12FA001-AC4F-418D-AE19-62706E023703}">
-                      <ahyp:hlinkClr xmlns:ahyp="http://schemas.microsoft.com/office/drawing/2018/hyperlinkcolor" xmlns:p15="http://schemas.microsoft.com/office/powerpoint/2012/main" xmlns:p14="http://schemas.microsoft.com/office/powerpoint/2010/main" xmlns:com="http://schemas.openxmlformats.org/drawingml/2006/compatibility" xmlns:pvml="urn:schemas-microsoft-com:office:powerpoint" xmlns:v="urn:schemas-microsoft-com:vml" xmlns:o="urn:schemas-microsoft-com:office:office" xmlns:dgm="http://schemas.openxmlformats.org/drawingml/2006/diagram" xmlns:c="http://schemas.openxmlformats.org/drawingml/2006/chart" xmlns:mv="urn:schemas-microsoft-com:mac:vml" xmlns:mc="http://schemas.openxmlformats.org/markup-compatibility/2006" xmlns="" val="tx"/>
+                      <ahyp:hlinkClr xmlns:ahyp="http://schemas.microsoft.com/office/drawing/2018/hyperlinkcolor" val="tx"/>
                     </a:ext>
                   </a:extLst>
                 </a:hlinkClick>
@@ -11738,7 +11673,7 @@
                 <a:hlinkClick r:id="rId10" action="ppaction://hlinksldjump">
                   <a:extLst>
                     <a:ext uri="{A12FA001-AC4F-418D-AE19-62706E023703}">
-                      <ahyp:hlinkClr xmlns:ahyp="http://schemas.microsoft.com/office/drawing/2018/hyperlinkcolor" xmlns:p15="http://schemas.microsoft.com/office/powerpoint/2012/main" xmlns:p14="http://schemas.microsoft.com/office/powerpoint/2010/main" xmlns:com="http://schemas.openxmlformats.org/drawingml/2006/compatibility" xmlns:pvml="urn:schemas-microsoft-com:office:powerpoint" xmlns:v="urn:schemas-microsoft-com:vml" xmlns:o="urn:schemas-microsoft-com:office:office" xmlns:dgm="http://schemas.openxmlformats.org/drawingml/2006/diagram" xmlns:c="http://schemas.openxmlformats.org/drawingml/2006/chart" xmlns:mv="urn:schemas-microsoft-com:mac:vml" xmlns:mc="http://schemas.openxmlformats.org/markup-compatibility/2006" xmlns="" val="tx"/>
+                      <ahyp:hlinkClr xmlns:ahyp="http://schemas.microsoft.com/office/drawing/2018/hyperlinkcolor" val="tx"/>
                     </a:ext>
                   </a:extLst>
                 </a:hlinkClick>

</xml_diff>